<commit_message>
finish my part, there is one blank remaining
</commit_message>
<xml_diff>
--- a/presentation/presentation.pptx
+++ b/presentation/presentation.pptx
@@ -110,6 +110,11 @@
       </a:defRPr>
     </a:lvl9pPr>
   </p:defaultTextStyle>
+  <p:extLst>
+    <p:ext uri="{EFAFB233-063F-42B5-8137-9DF3F51BA10A}">
+      <p15:sldGuideLst xmlns:p15="http://schemas.microsoft.com/office/powerpoint/2012/main"/>
+    </p:ext>
+  </p:extLst>
 </p:presentation>
 </file>
 
@@ -244,7 +249,7 @@
           <a:p>
             <a:fld id="{4467E274-8051-4629-BD4D-446DEEC21AA4}" type="datetimeFigureOut">
               <a:rPr lang="zh-CN" altLang="en-US" smtClean="0"/>
-              <a:t>2017/5/10</a:t>
+              <a:t>2017/5/11</a:t>
             </a:fld>
             <a:endParaRPr lang="zh-CN" altLang="en-US"/>
           </a:p>
@@ -414,7 +419,7 @@
           <a:p>
             <a:fld id="{4467E274-8051-4629-BD4D-446DEEC21AA4}" type="datetimeFigureOut">
               <a:rPr lang="zh-CN" altLang="en-US" smtClean="0"/>
-              <a:t>2017/5/10</a:t>
+              <a:t>2017/5/11</a:t>
             </a:fld>
             <a:endParaRPr lang="zh-CN" altLang="en-US"/>
           </a:p>
@@ -594,7 +599,7 @@
           <a:p>
             <a:fld id="{4467E274-8051-4629-BD4D-446DEEC21AA4}" type="datetimeFigureOut">
               <a:rPr lang="zh-CN" altLang="en-US" smtClean="0"/>
-              <a:t>2017/5/10</a:t>
+              <a:t>2017/5/11</a:t>
             </a:fld>
             <a:endParaRPr lang="zh-CN" altLang="en-US"/>
           </a:p>
@@ -764,7 +769,7 @@
           <a:p>
             <a:fld id="{4467E274-8051-4629-BD4D-446DEEC21AA4}" type="datetimeFigureOut">
               <a:rPr lang="zh-CN" altLang="en-US" smtClean="0"/>
-              <a:t>2017/5/10</a:t>
+              <a:t>2017/5/11</a:t>
             </a:fld>
             <a:endParaRPr lang="zh-CN" altLang="en-US"/>
           </a:p>
@@ -1010,7 +1015,7 @@
           <a:p>
             <a:fld id="{4467E274-8051-4629-BD4D-446DEEC21AA4}" type="datetimeFigureOut">
               <a:rPr lang="zh-CN" altLang="en-US" smtClean="0"/>
-              <a:t>2017/5/10</a:t>
+              <a:t>2017/5/11</a:t>
             </a:fld>
             <a:endParaRPr lang="zh-CN" altLang="en-US"/>
           </a:p>
@@ -1242,7 +1247,7 @@
           <a:p>
             <a:fld id="{4467E274-8051-4629-BD4D-446DEEC21AA4}" type="datetimeFigureOut">
               <a:rPr lang="zh-CN" altLang="en-US" smtClean="0"/>
-              <a:t>2017/5/10</a:t>
+              <a:t>2017/5/11</a:t>
             </a:fld>
             <a:endParaRPr lang="zh-CN" altLang="en-US"/>
           </a:p>
@@ -1609,7 +1614,7 @@
           <a:p>
             <a:fld id="{4467E274-8051-4629-BD4D-446DEEC21AA4}" type="datetimeFigureOut">
               <a:rPr lang="zh-CN" altLang="en-US" smtClean="0"/>
-              <a:t>2017/5/10</a:t>
+              <a:t>2017/5/11</a:t>
             </a:fld>
             <a:endParaRPr lang="zh-CN" altLang="en-US"/>
           </a:p>
@@ -1727,7 +1732,7 @@
           <a:p>
             <a:fld id="{4467E274-8051-4629-BD4D-446DEEC21AA4}" type="datetimeFigureOut">
               <a:rPr lang="zh-CN" altLang="en-US" smtClean="0"/>
-              <a:t>2017/5/10</a:t>
+              <a:t>2017/5/11</a:t>
             </a:fld>
             <a:endParaRPr lang="zh-CN" altLang="en-US"/>
           </a:p>
@@ -1822,7 +1827,7 @@
           <a:p>
             <a:fld id="{4467E274-8051-4629-BD4D-446DEEC21AA4}" type="datetimeFigureOut">
               <a:rPr lang="zh-CN" altLang="en-US" smtClean="0"/>
-              <a:t>2017/5/10</a:t>
+              <a:t>2017/5/11</a:t>
             </a:fld>
             <a:endParaRPr lang="zh-CN" altLang="en-US"/>
           </a:p>
@@ -2099,7 +2104,7 @@
           <a:p>
             <a:fld id="{4467E274-8051-4629-BD4D-446DEEC21AA4}" type="datetimeFigureOut">
               <a:rPr lang="zh-CN" altLang="en-US" smtClean="0"/>
-              <a:t>2017/5/10</a:t>
+              <a:t>2017/5/11</a:t>
             </a:fld>
             <a:endParaRPr lang="zh-CN" altLang="en-US"/>
           </a:p>
@@ -2352,7 +2357,7 @@
           <a:p>
             <a:fld id="{4467E274-8051-4629-BD4D-446DEEC21AA4}" type="datetimeFigureOut">
               <a:rPr lang="zh-CN" altLang="en-US" smtClean="0"/>
-              <a:t>2017/5/10</a:t>
+              <a:t>2017/5/11</a:t>
             </a:fld>
             <a:endParaRPr lang="zh-CN" altLang="en-US"/>
           </a:p>
@@ -2565,7 +2570,7 @@
           <a:p>
             <a:fld id="{4467E274-8051-4629-BD4D-446DEEC21AA4}" type="datetimeFigureOut">
               <a:rPr lang="zh-CN" altLang="en-US" smtClean="0"/>
-              <a:t>2017/5/10</a:t>
+              <a:t>2017/5/11</a:t>
             </a:fld>
             <a:endParaRPr lang="zh-CN" altLang="en-US"/>
           </a:p>
@@ -3501,14 +3506,14 @@
             <p:ph idx="1"/>
             <p:extLst>
               <p:ext uri="{D42A27DB-BD31-4B8C-83A1-F6EECF244321}">
-                <p14:modId xmlns:p14="http://schemas.microsoft.com/office/powerpoint/2010/main" val="1394492205"/>
+                <p14:modId xmlns:p14="http://schemas.microsoft.com/office/powerpoint/2010/main" val="1193719672"/>
               </p:ext>
             </p:extLst>
           </p:nvPr>
         </p:nvGraphicFramePr>
         <p:xfrm>
           <a:off x="838200" y="1825625"/>
-          <a:ext cx="10515600" cy="1483360"/>
+          <a:ext cx="10515600" cy="2565400"/>
         </p:xfrm>
         <a:graphic>
           <a:graphicData uri="http://schemas.openxmlformats.org/drawingml/2006/table">
@@ -3585,6 +3590,30 @@
                     <a:bodyPr/>
                     <a:lstStyle/>
                     <a:p>
+                      <a:pPr marL="342900" indent="-342900">
+                        <a:buAutoNum type="arabicPeriod"/>
+                      </a:pPr>
+                      <a:r>
+                        <a:rPr lang="en-US" altLang="zh-CN" dirty="0" smtClean="0"/>
+                        <a:t>Assign</a:t>
+                      </a:r>
+                      <a:r>
+                        <a:rPr lang="en-US" altLang="zh-CN" baseline="0" dirty="0" smtClean="0"/>
+                        <a:t> reads to lowest taxonomic level</a:t>
+                      </a:r>
+                    </a:p>
+                    <a:p>
+                      <a:pPr marL="342900" indent="-342900">
+                        <a:buAutoNum type="arabicPeriod"/>
+                      </a:pPr>
+                      <a:r>
+                        <a:rPr lang="en-US" altLang="zh-CN" dirty="0" smtClean="0"/>
+                        <a:t>Powerful visualization</a:t>
+                      </a:r>
+                      <a:r>
+                        <a:rPr lang="en-US" altLang="zh-CN" baseline="0" dirty="0" smtClean="0"/>
+                        <a:t> toolkit</a:t>
+                      </a:r>
                       <a:endParaRPr lang="zh-CN" altLang="en-US" dirty="0"/>
                     </a:p>
                   </a:txBody>
@@ -3595,7 +3624,27 @@
                     <a:bodyPr/>
                     <a:lstStyle/>
                     <a:p>
-                      <a:endParaRPr lang="zh-CN" altLang="en-US"/>
+                      <a:pPr marL="342900" indent="-342900">
+                        <a:buAutoNum type="arabicPeriod"/>
+                      </a:pPr>
+                      <a:r>
+                        <a:rPr lang="en-US" altLang="zh-CN" dirty="0" smtClean="0"/>
+                        <a:t>Ambiguous</a:t>
+                      </a:r>
+                      <a:r>
+                        <a:rPr lang="en-US" altLang="zh-CN" baseline="0" dirty="0" smtClean="0"/>
+                        <a:t> mapping reads ignores individual strains</a:t>
+                      </a:r>
+                    </a:p>
+                    <a:p>
+                      <a:pPr marL="342900" indent="-342900">
+                        <a:buAutoNum type="arabicPeriod"/>
+                      </a:pPr>
+                      <a:r>
+                        <a:rPr lang="en-US" altLang="zh-CN" baseline="0" dirty="0" smtClean="0"/>
+                        <a:t>Computation problem</a:t>
+                      </a:r>
+                      <a:endParaRPr lang="zh-CN" altLang="en-US" dirty="0"/>
                     </a:p>
                   </a:txBody>
                   <a:tcPr/>
@@ -3621,7 +3670,21 @@
                     <a:bodyPr/>
                     <a:lstStyle/>
                     <a:p>
-                      <a:endParaRPr lang="zh-CN" altLang="en-US"/>
+                      <a:pPr marL="342900" indent="-342900">
+                        <a:buAutoNum type="arabicPeriod"/>
+                      </a:pPr>
+                      <a:r>
+                        <a:rPr lang="en-US" altLang="zh-CN" dirty="0" smtClean="0"/>
+                        <a:t>Instead of read alignment, k-</a:t>
+                      </a:r>
+                      <a:r>
+                        <a:rPr lang="en-US" altLang="zh-CN" dirty="0" err="1" smtClean="0"/>
+                        <a:t>mer</a:t>
+                      </a:r>
+                      <a:r>
+                        <a:rPr lang="en-US" altLang="zh-CN" dirty="0" smtClean="0"/>
+                        <a:t> hashing</a:t>
+                      </a:r>
                     </a:p>
                   </a:txBody>
                   <a:tcPr/>
@@ -3631,7 +3694,13 @@
                     <a:bodyPr/>
                     <a:lstStyle/>
                     <a:p>
-                      <a:endParaRPr lang="zh-CN" altLang="en-US"/>
+                      <a:pPr marL="342900" indent="-342900">
+                        <a:buAutoNum type="arabicPeriod"/>
+                      </a:pPr>
+                      <a:r>
+                        <a:rPr lang="en-US" altLang="zh-CN" baseline="0" dirty="0" smtClean="0"/>
+                        <a:t>Speed at a cost</a:t>
+                      </a:r>
                     </a:p>
                   </a:txBody>
                   <a:tcPr/>
@@ -3657,7 +3726,22 @@
                     <a:bodyPr/>
                     <a:lstStyle/>
                     <a:p>
-                      <a:endParaRPr lang="zh-CN" altLang="en-US"/>
+                      <a:pPr marL="342900" indent="-342900">
+                        <a:buAutoNum type="arabicPeriod"/>
+                      </a:pPr>
+                      <a:r>
+                        <a:rPr lang="en-US" altLang="zh-CN" dirty="0" smtClean="0"/>
+                        <a:t>More accurate</a:t>
+                      </a:r>
+                    </a:p>
+                    <a:p>
+                      <a:pPr marL="342900" indent="-342900">
+                        <a:buAutoNum type="arabicPeriod"/>
+                      </a:pPr>
+                      <a:r>
+                        <a:rPr lang="en-US" altLang="zh-CN" dirty="0" smtClean="0"/>
+                        <a:t>Faster(“negligible”)</a:t>
+                      </a:r>
                     </a:p>
                   </a:txBody>
                   <a:tcPr/>
@@ -3667,7 +3751,35 @@
                     <a:bodyPr/>
                     <a:lstStyle/>
                     <a:p>
-                      <a:endParaRPr lang="zh-CN" altLang="en-US" dirty="0"/>
+                      <a:r>
+                        <a:rPr lang="en-US" altLang="zh-CN" dirty="0" smtClean="0">
+                          <a:solidFill>
+                            <a:srgbClr val="FF0000"/>
+                          </a:solidFill>
+                        </a:rPr>
+                        <a:t>(currently</a:t>
+                      </a:r>
+                      <a:r>
+                        <a:rPr lang="en-US" altLang="zh-CN" baseline="0" dirty="0" smtClean="0">
+                          <a:solidFill>
+                            <a:srgbClr val="FF0000"/>
+                          </a:solidFill>
+                        </a:rPr>
+                        <a:t> not found in the paper</a:t>
+                      </a:r>
+                      <a:r>
+                        <a:rPr lang="en-US" altLang="zh-CN" dirty="0" smtClean="0">
+                          <a:solidFill>
+                            <a:srgbClr val="FF0000"/>
+                          </a:solidFill>
+                        </a:rPr>
+                        <a:t>)</a:t>
+                      </a:r>
+                      <a:endParaRPr lang="zh-CN" altLang="en-US" dirty="0">
+                        <a:solidFill>
+                          <a:srgbClr val="FF0000"/>
+                        </a:solidFill>
+                      </a:endParaRPr>
                     </a:p>
                   </a:txBody>
                   <a:tcPr/>
@@ -3685,7 +3797,7 @@
         </p:nvSpPr>
         <p:spPr>
           <a:xfrm>
-            <a:off x="941696" y="4169391"/>
+            <a:off x="1009935" y="4838131"/>
             <a:ext cx="6612340" cy="369332"/>
           </a:xfrm>
           <a:prstGeom prst="rect">
@@ -4086,12 +4198,22 @@
         </p:nvSpPr>
         <p:spPr/>
         <p:txBody>
-          <a:bodyPr/>
-          <a:lstStyle/>
-          <a:p>
-            <a:r>
-              <a:rPr lang="en-US" altLang="zh-CN" dirty="0" smtClean="0"/>
-              <a:t>Q1. In order to test the hypotheses that RNA-</a:t>
+          <a:bodyPr>
+            <a:normAutofit fontScale="92500" lnSpcReduction="10000"/>
+          </a:bodyPr>
+          <a:lstStyle/>
+          <a:p>
+            <a:r>
+              <a:rPr lang="en-US" altLang="zh-CN" dirty="0" smtClean="0"/>
+              <a:t>Q1. In order to test the </a:t>
+            </a:r>
+            <a:r>
+              <a:rPr lang="en-US" altLang="zh-CN" dirty="0" smtClean="0"/>
+              <a:t>hypothesis </a:t>
+            </a:r>
+            <a:r>
+              <a:rPr lang="en-US" altLang="zh-CN" dirty="0" smtClean="0"/>
+              <a:t>that RNA-</a:t>
             </a:r>
             <a:r>
               <a:rPr lang="en-US" altLang="zh-CN" dirty="0" err="1" smtClean="0"/>
@@ -4129,8 +4251,69 @@
           <a:p>
             <a:r>
               <a:rPr lang="en-US" altLang="zh-CN" dirty="0" smtClean="0"/>
-              <a:t>A1. (Cong)</a:t>
-            </a:r>
+              <a:t>A1. </a:t>
+            </a:r>
+            <a:r>
+              <a:rPr lang="en-US" altLang="zh-CN" dirty="0" smtClean="0"/>
+              <a:t>As we know, the author ran </a:t>
+            </a:r>
+            <a:r>
+              <a:rPr lang="en-US" altLang="zh-CN" dirty="0" err="1" smtClean="0"/>
+              <a:t>eXpress</a:t>
+            </a:r>
+            <a:r>
+              <a:rPr lang="en-US" altLang="zh-CN" dirty="0" smtClean="0"/>
+              <a:t> program to test the hypothesis mentioned before. It is clear that </a:t>
+            </a:r>
+            <a:r>
+              <a:rPr lang="en-US" altLang="zh-CN" dirty="0" err="1" smtClean="0"/>
+              <a:t>eXpress</a:t>
+            </a:r>
+            <a:r>
+              <a:rPr lang="en-US" altLang="zh-CN" dirty="0" smtClean="0"/>
+              <a:t> is a program for RNA-</a:t>
+            </a:r>
+            <a:r>
+              <a:rPr lang="en-US" altLang="zh-CN" dirty="0" err="1" smtClean="0"/>
+              <a:t>Seq</a:t>
+            </a:r>
+            <a:r>
+              <a:rPr lang="en-US" altLang="zh-CN" dirty="0" smtClean="0"/>
+              <a:t>, while </a:t>
+            </a:r>
+            <a:r>
+              <a:rPr lang="en-US" altLang="zh-CN" dirty="0" err="1" smtClean="0"/>
+              <a:t>GASiC</a:t>
+            </a:r>
+            <a:r>
+              <a:rPr lang="en-US" altLang="zh-CN" dirty="0" smtClean="0"/>
+              <a:t> is a program for metagenomics analysis. In the first approach, the author evaluated the result of </a:t>
+            </a:r>
+            <a:r>
+              <a:rPr lang="en-US" altLang="zh-CN" dirty="0" err="1" smtClean="0"/>
+              <a:t>eXpress</a:t>
+            </a:r>
+            <a:r>
+              <a:rPr lang="en-US" altLang="zh-CN" dirty="0" smtClean="0"/>
+              <a:t> on metagenomics, and it turned out to be better than </a:t>
+            </a:r>
+            <a:r>
+              <a:rPr lang="en-US" altLang="zh-CN" dirty="0" err="1" smtClean="0"/>
+              <a:t>GASiC</a:t>
+            </a:r>
+            <a:r>
+              <a:rPr lang="en-US" altLang="zh-CN" dirty="0" smtClean="0"/>
+              <a:t>, which means that hypothesis is thus </a:t>
+            </a:r>
+            <a:r>
+              <a:rPr lang="en-US" altLang="zh-CN" dirty="0" err="1" smtClean="0"/>
+              <a:t>comfirmed</a:t>
+            </a:r>
+            <a:r>
+              <a:rPr lang="en-US" altLang="zh-CN" dirty="0" smtClean="0"/>
+              <a:t>. </a:t>
+            </a:r>
+            <a:endParaRPr lang="en-US" altLang="zh-CN" dirty="0" smtClean="0"/>
           </a:p>
           <a:p>
             <a:r>

</xml_diff>